<commit_message>
Replace FP3_Presentation.pptx with updated and finished presentation
</commit_message>
<xml_diff>
--- a/FP3_Presentation.pptx
+++ b/FP3_Presentation.pptx
@@ -108,6 +108,11 @@
       </a:defRPr>
     </a:lvl9pPr>
   </p:defaultTextStyle>
+  <p:extLst>
+    <p:ext uri="{EFAFB233-063F-42B5-8137-9DF3F51BA10A}">
+      <p15:sldGuideLst xmlns:p15="http://schemas.microsoft.com/office/powerpoint/2012/main"/>
+    </p:ext>
+  </p:extLst>
 </p:presentation>
 </file>
 
@@ -6103,7 +6108,7 @@
       </p:grpSpPr>
       <p:sp>
         <p:nvSpPr>
-          <p:cNvPr id="137" name="Rectangle 136">
+          <p:cNvPr id="192" name="Rectangle 191">
             <a:extLst>
               <a:ext uri="{FF2B5EF4-FFF2-40B4-BE49-F238E27FC236}">
                 <a16:creationId xmlns:a16="http://schemas.microsoft.com/office/drawing/2014/main" id="{8D06CE56-3881-4ADA-8CEF-D18B02C242A3}"/>
@@ -6195,7 +6200,7 @@
       </p:sp>
       <p:sp>
         <p:nvSpPr>
-          <p:cNvPr id="139" name="Rectangle 138">
+          <p:cNvPr id="193" name="Rectangle 192">
             <a:extLst>
               <a:ext uri="{FF2B5EF4-FFF2-40B4-BE49-F238E27FC236}">
                 <a16:creationId xmlns:a16="http://schemas.microsoft.com/office/drawing/2014/main" id="{79F3C543-62EC-4433-9C93-A2CD8764E9B4}"/>
@@ -6291,7 +6296,7 @@
       </p:sp>
       <p:sp useBgFill="1">
         <p:nvSpPr>
-          <p:cNvPr id="141" name="Rectangle 140">
+          <p:cNvPr id="194" name="Rectangle 193">
             <a:extLst>
               <a:ext uri="{FF2B5EF4-FFF2-40B4-BE49-F238E27FC236}">
                 <a16:creationId xmlns:a16="http://schemas.microsoft.com/office/drawing/2014/main" id="{D0394FE2-BDDA-4ECE-B320-81AE19E90566}"/>
@@ -6351,7 +6356,7 @@
       </p:sp>
       <p:sp useBgFill="1">
         <p:nvSpPr>
-          <p:cNvPr id="143" name="Rectangle 142">
+          <p:cNvPr id="195" name="Rectangle 194">
             <a:extLst>
               <a:ext uri="{FF2B5EF4-FFF2-40B4-BE49-F238E27FC236}">
                 <a16:creationId xmlns:a16="http://schemas.microsoft.com/office/drawing/2014/main" id="{0625AAC5-802A-4197-8804-2B78FF65CEE8}"/>
@@ -6489,7 +6494,7 @@
       </p:sp>
       <p:sp>
         <p:nvSpPr>
-          <p:cNvPr id="145" name="Rectangle: Rounded Corners 144">
+          <p:cNvPr id="196" name="Rectangle: Rounded Corners 195">
             <a:extLst>
               <a:ext uri="{FF2B5EF4-FFF2-40B4-BE49-F238E27FC236}">
                 <a16:creationId xmlns:a16="http://schemas.microsoft.com/office/drawing/2014/main" id="{A1B139DD-0E8D-42FA-9171-C5F001754A88}"/>
@@ -6628,19 +6633,17 @@
       </p:pic>
       <p:pic>
         <p:nvPicPr>
-          <p:cNvPr id="1026" name="Picture 2">
-            <a:extLst>
-              <a:ext uri="{FF2B5EF4-FFF2-40B4-BE49-F238E27FC236}">
-                <a16:creationId xmlns:a16="http://schemas.microsoft.com/office/drawing/2014/main" id="{1C1492D5-AF0D-4F5E-A9D0-4F20859C3701}"/>
+          <p:cNvPr id="1030" name="Picture 6">
+            <a:extLst>
+              <a:ext uri="{FF2B5EF4-FFF2-40B4-BE49-F238E27FC236}">
+                <a16:creationId xmlns:a16="http://schemas.microsoft.com/office/drawing/2014/main" id="{E7672A11-4C94-4A63-9E1A-F41AEC3C236E}"/>
               </a:ext>
             </a:extLst>
           </p:cNvPr>
           <p:cNvPicPr>
-            <a:picLocks noGrp="1" noChangeAspect="1" noChangeArrowheads="1"/>
+            <a:picLocks noChangeAspect="1" noChangeArrowheads="1"/>
           </p:cNvPicPr>
-          <p:nvPr>
-            <p:ph idx="1"/>
-          </p:nvPr>
+          <p:nvPr/>
         </p:nvPicPr>
         <p:blipFill rotWithShape="1">
           <a:blip r:embed="rId3">
@@ -6650,7 +6653,7 @@
               </a:ext>
             </a:extLst>
           </a:blip>
-          <a:srcRect r="3" b="11997"/>
+          <a:srcRect l="362" r="-2" b="-2"/>
           <a:stretch/>
         </p:blipFill>
         <p:spPr bwMode="auto">
@@ -6683,6 +6686,174 @@
   <p:clrMapOvr>
     <a:masterClrMapping/>
   </p:clrMapOvr>
+  <p:timing>
+    <p:tnLst>
+      <p:par>
+        <p:cTn id="1" dur="indefinite" restart="never" nodeType="tmRoot">
+          <p:childTnLst>
+            <p:seq concurrent="1" nextAc="seek">
+              <p:cTn id="2" dur="indefinite" nodeType="mainSeq">
+                <p:childTnLst>
+                  <p:par>
+                    <p:cTn id="3" fill="hold">
+                      <p:stCondLst>
+                        <p:cond delay="indefinite"/>
+                        <p:cond evt="onBegin" delay="0">
+                          <p:tn val="2"/>
+                        </p:cond>
+                      </p:stCondLst>
+                      <p:childTnLst>
+                        <p:par>
+                          <p:cTn id="4" fill="hold">
+                            <p:stCondLst>
+                              <p:cond delay="0"/>
+                            </p:stCondLst>
+                            <p:childTnLst>
+                              <p:par>
+                                <p:cTn id="5" presetID="10" presetClass="entr" presetSubtype="0" fill="hold" nodeType="withEffect">
+                                  <p:stCondLst>
+                                    <p:cond delay="0"/>
+                                  </p:stCondLst>
+                                  <p:iterate>
+                                    <p:tmPct val="10000"/>
+                                  </p:iterate>
+                                  <p:childTnLst>
+                                    <p:set>
+                                      <p:cBhvr>
+                                        <p:cTn id="6" dur="1" fill="hold">
+                                          <p:stCondLst>
+                                            <p:cond delay="0"/>
+                                          </p:stCondLst>
+                                        </p:cTn>
+                                        <p:tgtEl>
+                                          <p:spTgt spid="1030"/>
+                                        </p:tgtEl>
+                                        <p:attrNameLst>
+                                          <p:attrName>style.visibility</p:attrName>
+                                        </p:attrNameLst>
+                                      </p:cBhvr>
+                                      <p:to>
+                                        <p:strVal val="visible"/>
+                                      </p:to>
+                                    </p:set>
+                                    <p:animEffect transition="in" filter="fade">
+                                      <p:cBhvr>
+                                        <p:cTn id="7" dur="700"/>
+                                        <p:tgtEl>
+                                          <p:spTgt spid="1030"/>
+                                        </p:tgtEl>
+                                      </p:cBhvr>
+                                    </p:animEffect>
+                                  </p:childTnLst>
+                                </p:cTn>
+                              </p:par>
+                              <p:par>
+                                <p:cTn id="8" presetID="10" presetClass="entr" presetSubtype="0" fill="hold" nodeType="withEffect">
+                                  <p:stCondLst>
+                                    <p:cond delay="0"/>
+                                  </p:stCondLst>
+                                  <p:iterate>
+                                    <p:tmPct val="10000"/>
+                                  </p:iterate>
+                                  <p:childTnLst>
+                                    <p:set>
+                                      <p:cBhvr>
+                                        <p:cTn id="9" dur="1" fill="hold">
+                                          <p:stCondLst>
+                                            <p:cond delay="0"/>
+                                          </p:stCondLst>
+                                        </p:cTn>
+                                        <p:tgtEl>
+                                          <p:spTgt spid="1028"/>
+                                        </p:tgtEl>
+                                        <p:attrNameLst>
+                                          <p:attrName>style.visibility</p:attrName>
+                                        </p:attrNameLst>
+                                      </p:cBhvr>
+                                      <p:to>
+                                        <p:strVal val="visible"/>
+                                      </p:to>
+                                    </p:set>
+                                    <p:animEffect transition="in" filter="fade">
+                                      <p:cBhvr>
+                                        <p:cTn id="10" dur="700"/>
+                                        <p:tgtEl>
+                                          <p:spTgt spid="1028"/>
+                                        </p:tgtEl>
+                                      </p:cBhvr>
+                                    </p:animEffect>
+                                  </p:childTnLst>
+                                </p:cTn>
+                              </p:par>
+                              <p:par>
+                                <p:cTn id="11" presetID="10" presetClass="entr" presetSubtype="0" fill="hold" grpId="0" nodeType="withEffect">
+                                  <p:stCondLst>
+                                    <p:cond delay="1000"/>
+                                  </p:stCondLst>
+                                  <p:iterate type="lt">
+                                    <p:tmPct val="10000"/>
+                                  </p:iterate>
+                                  <p:childTnLst>
+                                    <p:set>
+                                      <p:cBhvr>
+                                        <p:cTn id="12" dur="1" fill="hold">
+                                          <p:stCondLst>
+                                            <p:cond delay="0"/>
+                                          </p:stCondLst>
+                                        </p:cTn>
+                                        <p:tgtEl>
+                                          <p:spTgt spid="2"/>
+                                        </p:tgtEl>
+                                        <p:attrNameLst>
+                                          <p:attrName>style.visibility</p:attrName>
+                                        </p:attrNameLst>
+                                      </p:cBhvr>
+                                      <p:to>
+                                        <p:strVal val="visible"/>
+                                      </p:to>
+                                    </p:set>
+                                    <p:animEffect transition="in" filter="fade">
+                                      <p:cBhvr>
+                                        <p:cTn id="13" dur="400"/>
+                                        <p:tgtEl>
+                                          <p:spTgt spid="2"/>
+                                        </p:tgtEl>
+                                      </p:cBhvr>
+                                    </p:animEffect>
+                                  </p:childTnLst>
+                                </p:cTn>
+                              </p:par>
+                            </p:childTnLst>
+                          </p:cTn>
+                        </p:par>
+                      </p:childTnLst>
+                    </p:cTn>
+                  </p:par>
+                </p:childTnLst>
+              </p:cTn>
+              <p:prevCondLst>
+                <p:cond evt="onPrev" delay="0">
+                  <p:tgtEl>
+                    <p:sldTgt/>
+                  </p:tgtEl>
+                </p:cond>
+              </p:prevCondLst>
+              <p:nextCondLst>
+                <p:cond evt="onNext" delay="0">
+                  <p:tgtEl>
+                    <p:sldTgt/>
+                  </p:tgtEl>
+                </p:cond>
+              </p:nextCondLst>
+            </p:seq>
+          </p:childTnLst>
+        </p:cTn>
+      </p:par>
+    </p:tnLst>
+    <p:bldLst>
+      <p:bldP spid="2" grpId="0"/>
+    </p:bldLst>
+  </p:timing>
 </p:sld>
 </file>
 
@@ -6749,10 +6920,39 @@
         </p:nvSpPr>
         <p:spPr/>
         <p:txBody>
-          <a:bodyPr/>
-          <a:lstStyle/>
-          <a:p>
-            <a:endParaRPr lang="en-US"/>
+          <a:bodyPr>
+            <a:normAutofit lnSpcReduction="10000"/>
+          </a:bodyPr>
+          <a:lstStyle/>
+          <a:p>
+            <a:r>
+              <a:rPr lang="en-US" dirty="0"/>
+              <a:t>Rising edge of clock caused many problems as things were cycling late due to it being incorrect.</a:t>
+            </a:r>
+          </a:p>
+          <a:p>
+            <a:r>
+              <a:rPr lang="en-US" dirty="0"/>
+              <a:t>Instructions in mem file were not as expected so testing was difficult</a:t>
+            </a:r>
+          </a:p>
+          <a:p>
+            <a:r>
+              <a:rPr lang="en-US" dirty="0"/>
+              <a:t>Top 2 bits weren’t changing so signal didn’t change</a:t>
+            </a:r>
+          </a:p>
+          <a:p>
+            <a:r>
+              <a:rPr lang="en-US" dirty="0"/>
+              <a:t>We were reading memory address as being off by 1 bit which made calculations wrong.</a:t>
+            </a:r>
+          </a:p>
+          <a:p>
+            <a:r>
+              <a:rPr lang="en-US" dirty="0"/>
+              <a:t>In the control unit some of our out signals were writing back to our instructions unintentionally.</a:t>
+            </a:r>
           </a:p>
         </p:txBody>
       </p:sp>
@@ -6772,6 +6972,14 @@
 <file path=ppt/slides/slide5.xml><?xml version="1.0" encoding="utf-8"?>
 <p:sld xmlns:a="http://schemas.openxmlformats.org/drawingml/2006/main" xmlns:r="http://schemas.openxmlformats.org/officeDocument/2006/relationships" xmlns:p="http://schemas.openxmlformats.org/presentationml/2006/main">
   <p:cSld>
+    <p:bg>
+      <p:bgPr>
+        <a:solidFill>
+          <a:schemeClr val="bg1"/>
+        </a:solidFill>
+        <a:effectLst/>
+      </p:bgPr>
+    </p:bg>
     <p:spTree>
       <p:nvGrpSpPr>
         <p:cNvPr id="1" name=""/>
@@ -6786,6 +6994,404 @@
           <a:chExt cx="0" cy="0"/>
         </a:xfrm>
       </p:grpSpPr>
+      <p:sp useBgFill="1">
+        <p:nvSpPr>
+          <p:cNvPr id="8" name="Rectangle 7">
+            <a:extLst>
+              <a:ext uri="{FF2B5EF4-FFF2-40B4-BE49-F238E27FC236}">
+                <a16:creationId xmlns:a16="http://schemas.microsoft.com/office/drawing/2014/main" id="{1C799903-48D5-4A31-A1A2-541072D9771E}"/>
+              </a:ext>
+              <a:ext uri="{C183D7F6-B498-43B3-948B-1728B52AA6E4}">
+                <adec:decorative xmlns:adec="http://schemas.microsoft.com/office/drawing/2017/decorative" val="1"/>
+              </a:ext>
+            </a:extLst>
+          </p:cNvPr>
+          <p:cNvSpPr>
+            <a:spLocks noGrp="1" noRot="1" noChangeAspect="1" noMove="1" noResize="1" noEditPoints="1" noAdjustHandles="1" noChangeArrowheads="1" noChangeShapeType="1" noTextEdit="1"/>
+          </p:cNvSpPr>
+          <p:nvPr>
+            <p:extLst>
+              <p:ext uri="{386F3935-93C4-4BCD-93E2-E3B085C9AB24}">
+                <p16:designElem xmlns:p16="http://schemas.microsoft.com/office/powerpoint/2015/main" val="1"/>
+              </p:ext>
+            </p:extLst>
+          </p:nvPr>
+        </p:nvSpPr>
+        <p:spPr>
+          <a:xfrm>
+            <a:off x="0" y="0"/>
+            <a:ext cx="12192002" cy="6858000"/>
+          </a:xfrm>
+          <a:prstGeom prst="rect">
+            <a:avLst/>
+          </a:prstGeom>
+          <a:ln>
+            <a:noFill/>
+          </a:ln>
+        </p:spPr>
+        <p:style>
+          <a:lnRef idx="2">
+            <a:schemeClr val="accent1">
+              <a:shade val="50000"/>
+            </a:schemeClr>
+          </a:lnRef>
+          <a:fillRef idx="1">
+            <a:schemeClr val="accent1"/>
+          </a:fillRef>
+          <a:effectRef idx="0">
+            <a:schemeClr val="accent1"/>
+          </a:effectRef>
+          <a:fontRef idx="minor">
+            <a:schemeClr val="lt1"/>
+          </a:fontRef>
+        </p:style>
+        <p:txBody>
+          <a:bodyPr rtlCol="0" anchor="ctr"/>
+          <a:lstStyle/>
+          <a:p>
+            <a:pPr algn="ctr"/>
+            <a:endParaRPr lang="en-US"/>
+          </a:p>
+        </p:txBody>
+      </p:sp>
+      <p:sp useBgFill="1">
+        <p:nvSpPr>
+          <p:cNvPr id="10" name="Freeform: Shape 9">
+            <a:extLst>
+              <a:ext uri="{FF2B5EF4-FFF2-40B4-BE49-F238E27FC236}">
+                <a16:creationId xmlns:a16="http://schemas.microsoft.com/office/drawing/2014/main" id="{8EFFF109-FC58-4FD3-BE05-9775A1310F55}"/>
+              </a:ext>
+              <a:ext uri="{C183D7F6-B498-43B3-948B-1728B52AA6E4}">
+                <adec:decorative xmlns:adec="http://schemas.microsoft.com/office/drawing/2017/decorative" val="1"/>
+              </a:ext>
+            </a:extLst>
+          </p:cNvPr>
+          <p:cNvSpPr>
+            <a:spLocks noGrp="1" noRot="1" noChangeAspect="1" noMove="1" noResize="1" noEditPoints="1" noAdjustHandles="1" noChangeArrowheads="1" noChangeShapeType="1" noTextEdit="1"/>
+          </p:cNvSpPr>
+          <p:nvPr>
+            <p:extLst>
+              <p:ext uri="{386F3935-93C4-4BCD-93E2-E3B085C9AB24}">
+                <p16:designElem xmlns:p16="http://schemas.microsoft.com/office/powerpoint/2015/main" val="1"/>
+              </p:ext>
+            </p:extLst>
+          </p:nvPr>
+        </p:nvSpPr>
+        <p:spPr>
+          <a:xfrm>
+            <a:off x="-1" y="0"/>
+            <a:ext cx="4818889" cy="6858000"/>
+          </a:xfrm>
+          <a:custGeom>
+            <a:avLst/>
+            <a:gdLst>
+              <a:gd name="connsiteX0" fmla="*/ 0 w 4818889"/>
+              <a:gd name="connsiteY0" fmla="*/ 0 h 6858000"/>
+              <a:gd name="connsiteX1" fmla="*/ 3605911 w 4818889"/>
+              <a:gd name="connsiteY1" fmla="*/ 0 h 6858000"/>
+              <a:gd name="connsiteX2" fmla="*/ 3668894 w 4818889"/>
+              <a:gd name="connsiteY2" fmla="*/ 69271 h 6858000"/>
+              <a:gd name="connsiteX3" fmla="*/ 4818889 w 4818889"/>
+              <a:gd name="connsiteY3" fmla="*/ 3429000 h 6858000"/>
+              <a:gd name="connsiteX4" fmla="*/ 3668894 w 4818889"/>
+              <a:gd name="connsiteY4" fmla="*/ 6788730 h 6858000"/>
+              <a:gd name="connsiteX5" fmla="*/ 3605911 w 4818889"/>
+              <a:gd name="connsiteY5" fmla="*/ 6858000 h 6858000"/>
+              <a:gd name="connsiteX6" fmla="*/ 0 w 4818889"/>
+              <a:gd name="connsiteY6" fmla="*/ 6858000 h 6858000"/>
+            </a:gdLst>
+            <a:ahLst/>
+            <a:cxnLst>
+              <a:cxn ang="0">
+                <a:pos x="connsiteX0" y="connsiteY0"/>
+              </a:cxn>
+              <a:cxn ang="0">
+                <a:pos x="connsiteX1" y="connsiteY1"/>
+              </a:cxn>
+              <a:cxn ang="0">
+                <a:pos x="connsiteX2" y="connsiteY2"/>
+              </a:cxn>
+              <a:cxn ang="0">
+                <a:pos x="connsiteX3" y="connsiteY3"/>
+              </a:cxn>
+              <a:cxn ang="0">
+                <a:pos x="connsiteX4" y="connsiteY4"/>
+              </a:cxn>
+              <a:cxn ang="0">
+                <a:pos x="connsiteX5" y="connsiteY5"/>
+              </a:cxn>
+              <a:cxn ang="0">
+                <a:pos x="connsiteX6" y="connsiteY6"/>
+              </a:cxn>
+            </a:cxnLst>
+            <a:rect l="l" t="t" r="r" b="b"/>
+            <a:pathLst>
+              <a:path w="4818889" h="6858000">
+                <a:moveTo>
+                  <a:pt x="0" y="0"/>
+                </a:moveTo>
+                <a:lnTo>
+                  <a:pt x="3605911" y="0"/>
+                </a:lnTo>
+                <a:lnTo>
+                  <a:pt x="3668894" y="69271"/>
+                </a:lnTo>
+                <a:cubicBezTo>
+                  <a:pt x="4379420" y="929100"/>
+                  <a:pt x="4818889" y="2116944"/>
+                  <a:pt x="4818889" y="3429000"/>
+                </a:cubicBezTo>
+                <a:cubicBezTo>
+                  <a:pt x="4818889" y="4741056"/>
+                  <a:pt x="4379420" y="5928900"/>
+                  <a:pt x="3668894" y="6788730"/>
+                </a:cubicBezTo>
+                <a:lnTo>
+                  <a:pt x="3605911" y="6858000"/>
+                </a:lnTo>
+                <a:lnTo>
+                  <a:pt x="0" y="6858000"/>
+                </a:lnTo>
+                <a:close/>
+              </a:path>
+            </a:pathLst>
+          </a:custGeom>
+          <a:ln w="9525">
+            <a:solidFill>
+              <a:schemeClr val="tx2">
+                <a:lumMod val="10000"/>
+                <a:lumOff val="90000"/>
+              </a:schemeClr>
+            </a:solidFill>
+          </a:ln>
+          <a:effectLst>
+            <a:outerShdw blurRad="50800" dist="38100" algn="l" rotWithShape="0">
+              <a:schemeClr val="bg1">
+                <a:lumMod val="85000"/>
+                <a:alpha val="30000"/>
+              </a:schemeClr>
+            </a:outerShdw>
+          </a:effectLst>
+        </p:spPr>
+        <p:style>
+          <a:lnRef idx="2">
+            <a:schemeClr val="accent1">
+              <a:shade val="50000"/>
+            </a:schemeClr>
+          </a:lnRef>
+          <a:fillRef idx="1">
+            <a:schemeClr val="accent1"/>
+          </a:fillRef>
+          <a:effectRef idx="0">
+            <a:schemeClr val="accent1"/>
+          </a:effectRef>
+          <a:fontRef idx="minor">
+            <a:schemeClr val="lt1"/>
+          </a:fontRef>
+        </p:style>
+        <p:txBody>
+          <a:bodyPr wrap="square" rtlCol="0" anchor="ctr">
+            <a:noAutofit/>
+          </a:bodyPr>
+          <a:lstStyle/>
+          <a:p>
+            <a:pPr marL="0" marR="0" lvl="0" indent="0" algn="ctr" defTabSz="914400" rtl="0" eaLnBrk="1" fontAlgn="auto" latinLnBrk="0" hangingPunct="1">
+              <a:lnSpc>
+                <a:spcPct val="100000"/>
+              </a:lnSpc>
+              <a:spcBef>
+                <a:spcPts val="0"/>
+              </a:spcBef>
+              <a:spcAft>
+                <a:spcPts val="0"/>
+              </a:spcAft>
+              <a:buClrTx/>
+              <a:buSzTx/>
+              <a:buFontTx/>
+              <a:buNone/>
+              <a:tabLst/>
+              <a:defRPr/>
+            </a:pPr>
+            <a:endParaRPr kumimoji="0" lang="en-US" sz="1800" b="0" i="0" u="none" strike="noStrike" kern="1200" cap="none" spc="0" normalizeH="0" baseline="0" noProof="0">
+              <a:ln>
+                <a:noFill/>
+              </a:ln>
+              <a:solidFill>
+                <a:prstClr val="white"/>
+              </a:solidFill>
+              <a:effectLst/>
+              <a:uLnTx/>
+              <a:uFillTx/>
+              <a:latin typeface="Calibri" panose="020F0502020204030204"/>
+              <a:ea typeface="+mn-ea"/>
+              <a:cs typeface="+mn-cs"/>
+            </a:endParaRPr>
+          </a:p>
+        </p:txBody>
+      </p:sp>
+      <p:sp useBgFill="1">
+        <p:nvSpPr>
+          <p:cNvPr id="12" name="Freeform: Shape 11">
+            <a:extLst>
+              <a:ext uri="{FF2B5EF4-FFF2-40B4-BE49-F238E27FC236}">
+                <a16:creationId xmlns:a16="http://schemas.microsoft.com/office/drawing/2014/main" id="{E1B96AD6-92A9-4273-A62B-96A1C3E0BA95}"/>
+              </a:ext>
+              <a:ext uri="{C183D7F6-B498-43B3-948B-1728B52AA6E4}">
+                <adec:decorative xmlns:adec="http://schemas.microsoft.com/office/drawing/2017/decorative" val="1"/>
+              </a:ext>
+            </a:extLst>
+          </p:cNvPr>
+          <p:cNvSpPr>
+            <a:spLocks noGrp="1" noRot="1" noChangeAspect="1" noMove="1" noResize="1" noEditPoints="1" noAdjustHandles="1" noChangeArrowheads="1" noChangeShapeType="1" noTextEdit="1"/>
+          </p:cNvSpPr>
+          <p:nvPr>
+            <p:extLst>
+              <p:ext uri="{386F3935-93C4-4BCD-93E2-E3B085C9AB24}">
+                <p16:designElem xmlns:p16="http://schemas.microsoft.com/office/powerpoint/2015/main" val="1"/>
+              </p:ext>
+            </p:extLst>
+          </p:nvPr>
+        </p:nvSpPr>
+        <p:spPr>
+          <a:xfrm>
+            <a:off x="1" y="0"/>
+            <a:ext cx="4811477" cy="6858000"/>
+          </a:xfrm>
+          <a:custGeom>
+            <a:avLst/>
+            <a:gdLst>
+              <a:gd name="connsiteX0" fmla="*/ 0 w 4811477"/>
+              <a:gd name="connsiteY0" fmla="*/ 0 h 6858000"/>
+              <a:gd name="connsiteX1" fmla="*/ 3598499 w 4811477"/>
+              <a:gd name="connsiteY1" fmla="*/ 0 h 6858000"/>
+              <a:gd name="connsiteX2" fmla="*/ 3661482 w 4811477"/>
+              <a:gd name="connsiteY2" fmla="*/ 69271 h 6858000"/>
+              <a:gd name="connsiteX3" fmla="*/ 4811477 w 4811477"/>
+              <a:gd name="connsiteY3" fmla="*/ 3429000 h 6858000"/>
+              <a:gd name="connsiteX4" fmla="*/ 3661482 w 4811477"/>
+              <a:gd name="connsiteY4" fmla="*/ 6788730 h 6858000"/>
+              <a:gd name="connsiteX5" fmla="*/ 3598499 w 4811477"/>
+              <a:gd name="connsiteY5" fmla="*/ 6858000 h 6858000"/>
+              <a:gd name="connsiteX6" fmla="*/ 0 w 4811477"/>
+              <a:gd name="connsiteY6" fmla="*/ 6858000 h 6858000"/>
+            </a:gdLst>
+            <a:ahLst/>
+            <a:cxnLst>
+              <a:cxn ang="0">
+                <a:pos x="connsiteX0" y="connsiteY0"/>
+              </a:cxn>
+              <a:cxn ang="0">
+                <a:pos x="connsiteX1" y="connsiteY1"/>
+              </a:cxn>
+              <a:cxn ang="0">
+                <a:pos x="connsiteX2" y="connsiteY2"/>
+              </a:cxn>
+              <a:cxn ang="0">
+                <a:pos x="connsiteX3" y="connsiteY3"/>
+              </a:cxn>
+              <a:cxn ang="0">
+                <a:pos x="connsiteX4" y="connsiteY4"/>
+              </a:cxn>
+              <a:cxn ang="0">
+                <a:pos x="connsiteX5" y="connsiteY5"/>
+              </a:cxn>
+              <a:cxn ang="0">
+                <a:pos x="connsiteX6" y="connsiteY6"/>
+              </a:cxn>
+            </a:cxnLst>
+            <a:rect l="l" t="t" r="r" b="b"/>
+            <a:pathLst>
+              <a:path w="4811477" h="6858000">
+                <a:moveTo>
+                  <a:pt x="0" y="0"/>
+                </a:moveTo>
+                <a:lnTo>
+                  <a:pt x="3598499" y="0"/>
+                </a:lnTo>
+                <a:lnTo>
+                  <a:pt x="3661482" y="69271"/>
+                </a:lnTo>
+                <a:cubicBezTo>
+                  <a:pt x="4372008" y="929100"/>
+                  <a:pt x="4811477" y="2116944"/>
+                  <a:pt x="4811477" y="3429000"/>
+                </a:cubicBezTo>
+                <a:cubicBezTo>
+                  <a:pt x="4811477" y="4741056"/>
+                  <a:pt x="4372008" y="5928900"/>
+                  <a:pt x="3661482" y="6788730"/>
+                </a:cubicBezTo>
+                <a:lnTo>
+                  <a:pt x="3598499" y="6858000"/>
+                </a:lnTo>
+                <a:lnTo>
+                  <a:pt x="0" y="6858000"/>
+                </a:lnTo>
+                <a:close/>
+              </a:path>
+            </a:pathLst>
+          </a:custGeom>
+          <a:ln w="9525">
+            <a:noFill/>
+          </a:ln>
+          <a:effectLst/>
+        </p:spPr>
+        <p:style>
+          <a:lnRef idx="2">
+            <a:schemeClr val="accent1">
+              <a:shade val="50000"/>
+            </a:schemeClr>
+          </a:lnRef>
+          <a:fillRef idx="1">
+            <a:schemeClr val="accent1"/>
+          </a:fillRef>
+          <a:effectRef idx="0">
+            <a:schemeClr val="accent1"/>
+          </a:effectRef>
+          <a:fontRef idx="minor">
+            <a:schemeClr val="lt1"/>
+          </a:fontRef>
+        </p:style>
+        <p:txBody>
+          <a:bodyPr wrap="square" rtlCol="0" anchor="ctr">
+            <a:noAutofit/>
+          </a:bodyPr>
+          <a:lstStyle/>
+          <a:p>
+            <a:pPr marL="0" marR="0" lvl="0" indent="0" algn="ctr" defTabSz="914400" rtl="0" eaLnBrk="1" fontAlgn="auto" latinLnBrk="0" hangingPunct="1">
+              <a:lnSpc>
+                <a:spcPct val="100000"/>
+              </a:lnSpc>
+              <a:spcBef>
+                <a:spcPts val="0"/>
+              </a:spcBef>
+              <a:spcAft>
+                <a:spcPts val="0"/>
+              </a:spcAft>
+              <a:buClrTx/>
+              <a:buSzTx/>
+              <a:buFontTx/>
+              <a:buNone/>
+              <a:tabLst/>
+              <a:defRPr/>
+            </a:pPr>
+            <a:endParaRPr kumimoji="0" lang="en-US" sz="1800" b="0" i="0" u="none" strike="noStrike" kern="1200" cap="none" spc="0" normalizeH="0" baseline="0" noProof="0">
+              <a:ln>
+                <a:noFill/>
+              </a:ln>
+              <a:solidFill>
+                <a:prstClr val="white"/>
+              </a:solidFill>
+              <a:effectLst/>
+              <a:uLnTx/>
+              <a:uFillTx/>
+              <a:latin typeface="Calibri" panose="020F0502020204030204"/>
+              <a:ea typeface="+mn-ea"/>
+              <a:cs typeface="+mn-cs"/>
+            </a:endParaRPr>
+          </a:p>
+        </p:txBody>
+      </p:sp>
       <p:sp>
         <p:nvSpPr>
           <p:cNvPr id="2" name="Title 1">
@@ -6802,9 +7408,16 @@
             <p:ph type="title"/>
           </p:nvPr>
         </p:nvSpPr>
-        <p:spPr/>
-        <p:txBody>
-          <a:bodyPr/>
+        <p:spPr>
+          <a:xfrm>
+            <a:off x="621792" y="1161288"/>
+            <a:ext cx="3602736" cy="4526280"/>
+          </a:xfrm>
+        </p:spPr>
+        <p:txBody>
+          <a:bodyPr>
+            <a:normAutofit/>
+          </a:bodyPr>
           <a:lstStyle/>
           <a:p>
             <a:r>
@@ -6816,6 +7429,98 @@
       </p:sp>
       <p:sp>
         <p:nvSpPr>
+          <p:cNvPr id="14" name="Rectangle 13">
+            <a:extLst>
+              <a:ext uri="{FF2B5EF4-FFF2-40B4-BE49-F238E27FC236}">
+                <a16:creationId xmlns:a16="http://schemas.microsoft.com/office/drawing/2014/main" id="{463EEC44-1BA3-44ED-81FC-A644B04B2A44}"/>
+              </a:ext>
+              <a:ext uri="{C183D7F6-B498-43B3-948B-1728B52AA6E4}">
+                <adec:decorative xmlns:adec="http://schemas.microsoft.com/office/drawing/2017/decorative" val="1"/>
+              </a:ext>
+            </a:extLst>
+          </p:cNvPr>
+          <p:cNvSpPr>
+            <a:spLocks noGrp="1" noRot="1" noChangeAspect="1" noMove="1" noResize="1" noEditPoints="1" noAdjustHandles="1" noChangeArrowheads="1" noChangeShapeType="1" noTextEdit="1"/>
+          </p:cNvSpPr>
+          <p:nvPr>
+            <p:extLst>
+              <p:ext uri="{386F3935-93C4-4BCD-93E2-E3B085C9AB24}">
+                <p16:designElem xmlns:p16="http://schemas.microsoft.com/office/powerpoint/2015/main" val="1"/>
+              </p:ext>
+            </p:extLst>
+          </p:nvPr>
+        </p:nvSpPr>
+        <p:spPr>
+          <a:xfrm>
+            <a:off x="0" y="3102049"/>
+            <a:ext cx="128016" cy="653903"/>
+          </a:xfrm>
+          <a:prstGeom prst="rect">
+            <a:avLst/>
+          </a:prstGeom>
+          <a:solidFill>
+            <a:schemeClr val="accent1"/>
+          </a:solidFill>
+          <a:ln>
+            <a:noFill/>
+          </a:ln>
+        </p:spPr>
+        <p:style>
+          <a:lnRef idx="2">
+            <a:schemeClr val="accent1">
+              <a:shade val="50000"/>
+            </a:schemeClr>
+          </a:lnRef>
+          <a:fillRef idx="1">
+            <a:schemeClr val="accent1"/>
+          </a:fillRef>
+          <a:effectRef idx="0">
+            <a:schemeClr val="accent1"/>
+          </a:effectRef>
+          <a:fontRef idx="minor">
+            <a:schemeClr val="lt1"/>
+          </a:fontRef>
+        </p:style>
+        <p:txBody>
+          <a:bodyPr rtlCol="0" anchor="ctr"/>
+          <a:lstStyle/>
+          <a:p>
+            <a:pPr marL="0" marR="0" lvl="0" indent="0" algn="ctr" defTabSz="914400" rtl="0" eaLnBrk="1" fontAlgn="auto" latinLnBrk="0" hangingPunct="1">
+              <a:lnSpc>
+                <a:spcPct val="100000"/>
+              </a:lnSpc>
+              <a:spcBef>
+                <a:spcPts val="0"/>
+              </a:spcBef>
+              <a:spcAft>
+                <a:spcPts val="0"/>
+              </a:spcAft>
+              <a:buClrTx/>
+              <a:buSzTx/>
+              <a:buFontTx/>
+              <a:buNone/>
+              <a:tabLst/>
+              <a:defRPr/>
+            </a:pPr>
+            <a:endParaRPr kumimoji="0" lang="en-US" sz="1800" b="0" i="0" u="none" strike="noStrike" kern="1200" cap="none" spc="0" normalizeH="0" baseline="0" noProof="0">
+              <a:ln>
+                <a:noFill/>
+              </a:ln>
+              <a:solidFill>
+                <a:prstClr val="white"/>
+              </a:solidFill>
+              <a:effectLst/>
+              <a:uLnTx/>
+              <a:uFillTx/>
+              <a:latin typeface="Calibri" panose="020F0502020204030204"/>
+              <a:ea typeface="+mn-ea"/>
+              <a:cs typeface="+mn-cs"/>
+            </a:endParaRPr>
+          </a:p>
+        </p:txBody>
+      </p:sp>
+      <p:sp>
+        <p:nvSpPr>
           <p:cNvPr id="3" name="Content Placeholder 2">
             <a:extLst>
               <a:ext uri="{FF2B5EF4-FFF2-40B4-BE49-F238E27FC236}">
@@ -6830,12 +7535,42 @@
             <p:ph idx="1"/>
           </p:nvPr>
         </p:nvSpPr>
-        <p:spPr/>
-        <p:txBody>
-          <a:bodyPr/>
-          <a:lstStyle/>
-          <a:p>
-            <a:endParaRPr lang="en-US"/>
+        <p:spPr>
+          <a:xfrm>
+            <a:off x="5434149" y="932688"/>
+            <a:ext cx="5916603" cy="4992624"/>
+          </a:xfrm>
+        </p:spPr>
+        <p:txBody>
+          <a:bodyPr anchor="ctr">
+            <a:normAutofit/>
+          </a:bodyPr>
+          <a:lstStyle/>
+          <a:p>
+            <a:r>
+              <a:rPr lang="en-US" sz="2000" dirty="0"/>
+              <a:t>Its surprisingly hard to work on the control unit and get the rest of the project to use it as intended and not shoot back errors all the time</a:t>
+            </a:r>
+          </a:p>
+          <a:p>
+            <a:r>
+              <a:rPr lang="en-US" sz="2000" dirty="0"/>
+              <a:t>In general, we are happy with the float packages but there are many kinks that our project has that need more work</a:t>
+            </a:r>
+          </a:p>
+          <a:p>
+            <a:r>
+              <a:rPr lang="en-US" sz="2000" dirty="0"/>
+              <a:t>A week for this project seemed like a hard goal to finish this in compared to the normal time we are used to getting per final project part as a lot more thinking was required to piece the </a:t>
+            </a:r>
+            <a:r>
+              <a:rPr lang="en-US" sz="2000"/>
+              <a:t>project together.</a:t>
+            </a:r>
+            <a:endParaRPr lang="en-US" sz="2000" dirty="0"/>
+          </a:p>
+          <a:p>
+            <a:endParaRPr lang="en-US" sz="2000" dirty="0"/>
           </a:p>
         </p:txBody>
       </p:sp>

</xml_diff>